<commit_message>
I have no idea if this will work Jack - I rendered the website let's pray.
</commit_message>
<xml_diff>
--- a/docs/files/quant-data-vis/Quantitative_Data_Visualisation.pptx
+++ b/docs/files/quant-data-vis/Quantitative_Data_Visualisation.pptx
@@ -16845,10 +16845,10 @@
               <a:buNone/>
             </a:pPr>
             <a:r>
-              <a:rPr lang="en-GB"/>
-              <a:t>ggplot syntax</a:t>
-            </a:r>
-            <a:endParaRPr/>
+              <a:rPr lang="en-GB" dirty="0"/>
+              <a:t>ggplot2 syntax</a:t>
+            </a:r>
+            <a:endParaRPr dirty="0"/>
           </a:p>
         </p:txBody>
       </p:sp>
@@ -17297,10 +17297,10 @@
               <a:buNone/>
             </a:pPr>
             <a:r>
-              <a:rPr lang="en-GB"/>
-              <a:t>ggplot syntax</a:t>
-            </a:r>
-            <a:endParaRPr/>
+              <a:rPr lang="en-GB" dirty="0"/>
+              <a:t>ggplot2 syntax</a:t>
+            </a:r>
+            <a:endParaRPr dirty="0"/>
           </a:p>
         </p:txBody>
       </p:sp>
@@ -24968,10 +24968,10 @@
               <a:buNone/>
             </a:pPr>
             <a:r>
-              <a:rPr lang="en-GB"/>
-              <a:t>Task 5 – Does Age interact with Music Taste?</a:t>
-            </a:r>
-            <a:endParaRPr/>
+              <a:rPr lang="en-GB" dirty="0"/>
+              <a:t>Task 5 – Does Age interact with Breakfast Habits?</a:t>
+            </a:r>
+            <a:endParaRPr dirty="0"/>
           </a:p>
         </p:txBody>
       </p:sp>

</xml_diff>